<commit_message>
Fix dates on slide decks
</commit_message>
<xml_diff>
--- a/slides/2018-01-17-FT-Interop.pptx
+++ b/slides/2018-01-17-FT-Interop.pptx
@@ -158,10 +158,9 @@
           </a:lstStyle>
           <a:p>
             <a:r>
-              <a:rPr lang="en-US" smtClean="0"/>
+              <a:rPr lang="en-US"/>
               <a:t>Click to edit Master title style</a:t>
             </a:r>
-            <a:endParaRPr lang="en-US"/>
           </a:p>
         </p:txBody>
       </p:sp>
@@ -223,10 +222,9 @@
           </a:lstStyle>
           <a:p>
             <a:r>
-              <a:rPr lang="en-US" smtClean="0"/>
+              <a:rPr lang="en-US"/>
               <a:t>Click to edit Master subtitle style</a:t>
             </a:r>
-            <a:endParaRPr lang="en-US"/>
           </a:p>
         </p:txBody>
       </p:sp>
@@ -247,7 +245,7 @@
           <a:p>
             <a:fld id="{E2593520-FD55-7B49-9493-2A983CF880CA}" type="datetimeFigureOut">
               <a:rPr lang="en-US" smtClean="0"/>
-              <a:t>1/17/18</a:t>
+              <a:t>1/31/18</a:t>
             </a:fld>
             <a:endParaRPr lang="en-US"/>
           </a:p>
@@ -341,10 +339,9 @@
           <a:lstStyle/>
           <a:p>
             <a:r>
-              <a:rPr lang="en-US" smtClean="0"/>
+              <a:rPr lang="en-US"/>
               <a:t>Click to edit Master title style</a:t>
             </a:r>
-            <a:endParaRPr lang="en-US"/>
           </a:p>
         </p:txBody>
       </p:sp>
@@ -365,38 +362,37 @@
           <a:p>
             <a:pPr lvl="0"/>
             <a:r>
-              <a:rPr lang="en-US" smtClean="0"/>
+              <a:rPr lang="en-US"/>
               <a:t>Click to edit Master text styles</a:t>
             </a:r>
           </a:p>
           <a:p>
             <a:pPr lvl="1"/>
             <a:r>
-              <a:rPr lang="en-US" smtClean="0"/>
+              <a:rPr lang="en-US"/>
               <a:t>Second level</a:t>
             </a:r>
           </a:p>
           <a:p>
             <a:pPr lvl="2"/>
             <a:r>
-              <a:rPr lang="en-US" smtClean="0"/>
+              <a:rPr lang="en-US"/>
               <a:t>Third level</a:t>
             </a:r>
           </a:p>
           <a:p>
             <a:pPr lvl="3"/>
             <a:r>
-              <a:rPr lang="en-US" smtClean="0"/>
+              <a:rPr lang="en-US"/>
               <a:t>Fourth level</a:t>
             </a:r>
           </a:p>
           <a:p>
             <a:pPr lvl="4"/>
             <a:r>
-              <a:rPr lang="en-US" smtClean="0"/>
+              <a:rPr lang="en-US"/>
               <a:t>Fifth level</a:t>
             </a:r>
-            <a:endParaRPr lang="en-US"/>
           </a:p>
         </p:txBody>
       </p:sp>
@@ -417,7 +413,7 @@
           <a:p>
             <a:fld id="{E2593520-FD55-7B49-9493-2A983CF880CA}" type="datetimeFigureOut">
               <a:rPr lang="en-US" smtClean="0"/>
-              <a:t>1/17/18</a:t>
+              <a:t>1/31/18</a:t>
             </a:fld>
             <a:endParaRPr lang="en-US"/>
           </a:p>
@@ -516,10 +512,9 @@
           <a:lstStyle/>
           <a:p>
             <a:r>
-              <a:rPr lang="en-US" smtClean="0"/>
+              <a:rPr lang="en-US"/>
               <a:t>Click to edit Master title style</a:t>
             </a:r>
-            <a:endParaRPr lang="en-US"/>
           </a:p>
         </p:txBody>
       </p:sp>
@@ -545,38 +540,37 @@
           <a:p>
             <a:pPr lvl="0"/>
             <a:r>
-              <a:rPr lang="en-US" smtClean="0"/>
+              <a:rPr lang="en-US"/>
               <a:t>Click to edit Master text styles</a:t>
             </a:r>
           </a:p>
           <a:p>
             <a:pPr lvl="1"/>
             <a:r>
-              <a:rPr lang="en-US" smtClean="0"/>
+              <a:rPr lang="en-US"/>
               <a:t>Second level</a:t>
             </a:r>
           </a:p>
           <a:p>
             <a:pPr lvl="2"/>
             <a:r>
-              <a:rPr lang="en-US" smtClean="0"/>
+              <a:rPr lang="en-US"/>
               <a:t>Third level</a:t>
             </a:r>
           </a:p>
           <a:p>
             <a:pPr lvl="3"/>
             <a:r>
-              <a:rPr lang="en-US" smtClean="0"/>
+              <a:rPr lang="en-US"/>
               <a:t>Fourth level</a:t>
             </a:r>
           </a:p>
           <a:p>
             <a:pPr lvl="4"/>
             <a:r>
-              <a:rPr lang="en-US" smtClean="0"/>
+              <a:rPr lang="en-US"/>
               <a:t>Fifth level</a:t>
             </a:r>
-            <a:endParaRPr lang="en-US"/>
           </a:p>
         </p:txBody>
       </p:sp>
@@ -597,7 +591,7 @@
           <a:p>
             <a:fld id="{E2593520-FD55-7B49-9493-2A983CF880CA}" type="datetimeFigureOut">
               <a:rPr lang="en-US" smtClean="0"/>
-              <a:t>1/17/18</a:t>
+              <a:t>1/31/18</a:t>
             </a:fld>
             <a:endParaRPr lang="en-US"/>
           </a:p>
@@ -691,10 +685,9 @@
           <a:lstStyle/>
           <a:p>
             <a:r>
-              <a:rPr lang="en-US" smtClean="0"/>
+              <a:rPr lang="en-US"/>
               <a:t>Click to edit Master title style</a:t>
             </a:r>
-            <a:endParaRPr lang="en-US"/>
           </a:p>
         </p:txBody>
       </p:sp>
@@ -715,38 +708,37 @@
           <a:p>
             <a:pPr lvl="0"/>
             <a:r>
-              <a:rPr lang="en-US" smtClean="0"/>
+              <a:rPr lang="en-US"/>
               <a:t>Click to edit Master text styles</a:t>
             </a:r>
           </a:p>
           <a:p>
             <a:pPr lvl="1"/>
             <a:r>
-              <a:rPr lang="en-US" smtClean="0"/>
+              <a:rPr lang="en-US"/>
               <a:t>Second level</a:t>
             </a:r>
           </a:p>
           <a:p>
             <a:pPr lvl="2"/>
             <a:r>
-              <a:rPr lang="en-US" smtClean="0"/>
+              <a:rPr lang="en-US"/>
               <a:t>Third level</a:t>
             </a:r>
           </a:p>
           <a:p>
             <a:pPr lvl="3"/>
             <a:r>
-              <a:rPr lang="en-US" smtClean="0"/>
+              <a:rPr lang="en-US"/>
               <a:t>Fourth level</a:t>
             </a:r>
           </a:p>
           <a:p>
             <a:pPr lvl="4"/>
             <a:r>
-              <a:rPr lang="en-US" smtClean="0"/>
+              <a:rPr lang="en-US"/>
               <a:t>Fifth level</a:t>
             </a:r>
-            <a:endParaRPr lang="en-US"/>
           </a:p>
         </p:txBody>
       </p:sp>
@@ -767,7 +759,7 @@
           <a:p>
             <a:fld id="{E2593520-FD55-7B49-9493-2A983CF880CA}" type="datetimeFigureOut">
               <a:rPr lang="en-US" smtClean="0"/>
-              <a:t>1/17/18</a:t>
+              <a:t>1/31/18</a:t>
             </a:fld>
             <a:endParaRPr lang="en-US"/>
           </a:p>
@@ -870,10 +862,9 @@
           </a:lstStyle>
           <a:p>
             <a:r>
-              <a:rPr lang="en-US" smtClean="0"/>
+              <a:rPr lang="en-US"/>
               <a:t>Click to edit Master title style</a:t>
             </a:r>
-            <a:endParaRPr lang="en-US"/>
           </a:p>
         </p:txBody>
       </p:sp>
@@ -990,7 +981,7 @@
           <a:p>
             <a:pPr lvl="0"/>
             <a:r>
-              <a:rPr lang="en-US" smtClean="0"/>
+              <a:rPr lang="en-US"/>
               <a:t>Click to edit Master text styles</a:t>
             </a:r>
           </a:p>
@@ -1013,7 +1004,7 @@
           <a:p>
             <a:fld id="{E2593520-FD55-7B49-9493-2A983CF880CA}" type="datetimeFigureOut">
               <a:rPr lang="en-US" smtClean="0"/>
-              <a:t>1/17/18</a:t>
+              <a:t>1/31/18</a:t>
             </a:fld>
             <a:endParaRPr lang="en-US"/>
           </a:p>
@@ -1107,10 +1098,9 @@
           <a:lstStyle/>
           <a:p>
             <a:r>
-              <a:rPr lang="en-US" smtClean="0"/>
+              <a:rPr lang="en-US"/>
               <a:t>Click to edit Master title style</a:t>
             </a:r>
-            <a:endParaRPr lang="en-US"/>
           </a:p>
         </p:txBody>
       </p:sp>
@@ -1136,38 +1126,37 @@
           <a:p>
             <a:pPr lvl="0"/>
             <a:r>
-              <a:rPr lang="en-US" smtClean="0"/>
+              <a:rPr lang="en-US"/>
               <a:t>Click to edit Master text styles</a:t>
             </a:r>
           </a:p>
           <a:p>
             <a:pPr lvl="1"/>
             <a:r>
-              <a:rPr lang="en-US" smtClean="0"/>
+              <a:rPr lang="en-US"/>
               <a:t>Second level</a:t>
             </a:r>
           </a:p>
           <a:p>
             <a:pPr lvl="2"/>
             <a:r>
-              <a:rPr lang="en-US" smtClean="0"/>
+              <a:rPr lang="en-US"/>
               <a:t>Third level</a:t>
             </a:r>
           </a:p>
           <a:p>
             <a:pPr lvl="3"/>
             <a:r>
-              <a:rPr lang="en-US" smtClean="0"/>
+              <a:rPr lang="en-US"/>
               <a:t>Fourth level</a:t>
             </a:r>
           </a:p>
           <a:p>
             <a:pPr lvl="4"/>
             <a:r>
-              <a:rPr lang="en-US" smtClean="0"/>
+              <a:rPr lang="en-US"/>
               <a:t>Fifth level</a:t>
             </a:r>
-            <a:endParaRPr lang="en-US"/>
           </a:p>
         </p:txBody>
       </p:sp>
@@ -1193,38 +1182,37 @@
           <a:p>
             <a:pPr lvl="0"/>
             <a:r>
-              <a:rPr lang="en-US" smtClean="0"/>
+              <a:rPr lang="en-US"/>
               <a:t>Click to edit Master text styles</a:t>
             </a:r>
           </a:p>
           <a:p>
             <a:pPr lvl="1"/>
             <a:r>
-              <a:rPr lang="en-US" smtClean="0"/>
+              <a:rPr lang="en-US"/>
               <a:t>Second level</a:t>
             </a:r>
           </a:p>
           <a:p>
             <a:pPr lvl="2"/>
             <a:r>
-              <a:rPr lang="en-US" smtClean="0"/>
+              <a:rPr lang="en-US"/>
               <a:t>Third level</a:t>
             </a:r>
           </a:p>
           <a:p>
             <a:pPr lvl="3"/>
             <a:r>
-              <a:rPr lang="en-US" smtClean="0"/>
+              <a:rPr lang="en-US"/>
               <a:t>Fourth level</a:t>
             </a:r>
           </a:p>
           <a:p>
             <a:pPr lvl="4"/>
             <a:r>
-              <a:rPr lang="en-US" smtClean="0"/>
+              <a:rPr lang="en-US"/>
               <a:t>Fifth level</a:t>
             </a:r>
-            <a:endParaRPr lang="en-US"/>
           </a:p>
         </p:txBody>
       </p:sp>
@@ -1245,7 +1233,7 @@
           <a:p>
             <a:fld id="{E2593520-FD55-7B49-9493-2A983CF880CA}" type="datetimeFigureOut">
               <a:rPr lang="en-US" smtClean="0"/>
-              <a:t>1/17/18</a:t>
+              <a:t>1/31/18</a:t>
             </a:fld>
             <a:endParaRPr lang="en-US"/>
           </a:p>
@@ -1344,10 +1332,9 @@
           <a:lstStyle/>
           <a:p>
             <a:r>
-              <a:rPr lang="en-US" smtClean="0"/>
+              <a:rPr lang="en-US"/>
               <a:t>Click to edit Master title style</a:t>
             </a:r>
-            <a:endParaRPr lang="en-US"/>
           </a:p>
         </p:txBody>
       </p:sp>
@@ -1410,7 +1397,7 @@
           <a:p>
             <a:pPr lvl="0"/>
             <a:r>
-              <a:rPr lang="en-US" smtClean="0"/>
+              <a:rPr lang="en-US"/>
               <a:t>Click to edit Master text styles</a:t>
             </a:r>
           </a:p>
@@ -1438,38 +1425,37 @@
           <a:p>
             <a:pPr lvl="0"/>
             <a:r>
-              <a:rPr lang="en-US" smtClean="0"/>
+              <a:rPr lang="en-US"/>
               <a:t>Click to edit Master text styles</a:t>
             </a:r>
           </a:p>
           <a:p>
             <a:pPr lvl="1"/>
             <a:r>
-              <a:rPr lang="en-US" smtClean="0"/>
+              <a:rPr lang="en-US"/>
               <a:t>Second level</a:t>
             </a:r>
           </a:p>
           <a:p>
             <a:pPr lvl="2"/>
             <a:r>
-              <a:rPr lang="en-US" smtClean="0"/>
+              <a:rPr lang="en-US"/>
               <a:t>Third level</a:t>
             </a:r>
           </a:p>
           <a:p>
             <a:pPr lvl="3"/>
             <a:r>
-              <a:rPr lang="en-US" smtClean="0"/>
+              <a:rPr lang="en-US"/>
               <a:t>Fourth level</a:t>
             </a:r>
           </a:p>
           <a:p>
             <a:pPr lvl="4"/>
             <a:r>
-              <a:rPr lang="en-US" smtClean="0"/>
+              <a:rPr lang="en-US"/>
               <a:t>Fifth level</a:t>
             </a:r>
-            <a:endParaRPr lang="en-US"/>
           </a:p>
         </p:txBody>
       </p:sp>
@@ -1532,7 +1518,7 @@
           <a:p>
             <a:pPr lvl="0"/>
             <a:r>
-              <a:rPr lang="en-US" smtClean="0"/>
+              <a:rPr lang="en-US"/>
               <a:t>Click to edit Master text styles</a:t>
             </a:r>
           </a:p>
@@ -1560,38 +1546,37 @@
           <a:p>
             <a:pPr lvl="0"/>
             <a:r>
-              <a:rPr lang="en-US" smtClean="0"/>
+              <a:rPr lang="en-US"/>
               <a:t>Click to edit Master text styles</a:t>
             </a:r>
           </a:p>
           <a:p>
             <a:pPr lvl="1"/>
             <a:r>
-              <a:rPr lang="en-US" smtClean="0"/>
+              <a:rPr lang="en-US"/>
               <a:t>Second level</a:t>
             </a:r>
           </a:p>
           <a:p>
             <a:pPr lvl="2"/>
             <a:r>
-              <a:rPr lang="en-US" smtClean="0"/>
+              <a:rPr lang="en-US"/>
               <a:t>Third level</a:t>
             </a:r>
           </a:p>
           <a:p>
             <a:pPr lvl="3"/>
             <a:r>
-              <a:rPr lang="en-US" smtClean="0"/>
+              <a:rPr lang="en-US"/>
               <a:t>Fourth level</a:t>
             </a:r>
           </a:p>
           <a:p>
             <a:pPr lvl="4"/>
             <a:r>
-              <a:rPr lang="en-US" smtClean="0"/>
+              <a:rPr lang="en-US"/>
               <a:t>Fifth level</a:t>
             </a:r>
-            <a:endParaRPr lang="en-US"/>
           </a:p>
         </p:txBody>
       </p:sp>
@@ -1612,7 +1597,7 @@
           <a:p>
             <a:fld id="{E2593520-FD55-7B49-9493-2A983CF880CA}" type="datetimeFigureOut">
               <a:rPr lang="en-US" smtClean="0"/>
-              <a:t>1/17/18</a:t>
+              <a:t>1/31/18</a:t>
             </a:fld>
             <a:endParaRPr lang="en-US"/>
           </a:p>
@@ -1706,10 +1691,9 @@
           <a:lstStyle/>
           <a:p>
             <a:r>
-              <a:rPr lang="en-US" smtClean="0"/>
+              <a:rPr lang="en-US"/>
               <a:t>Click to edit Master title style</a:t>
             </a:r>
-            <a:endParaRPr lang="en-US"/>
           </a:p>
         </p:txBody>
       </p:sp>
@@ -1730,7 +1714,7 @@
           <a:p>
             <a:fld id="{E2593520-FD55-7B49-9493-2A983CF880CA}" type="datetimeFigureOut">
               <a:rPr lang="en-US" smtClean="0"/>
-              <a:t>1/17/18</a:t>
+              <a:t>1/31/18</a:t>
             </a:fld>
             <a:endParaRPr lang="en-US"/>
           </a:p>
@@ -1825,7 +1809,7 @@
           <a:p>
             <a:fld id="{E2593520-FD55-7B49-9493-2A983CF880CA}" type="datetimeFigureOut">
               <a:rPr lang="en-US" smtClean="0"/>
-              <a:t>1/17/18</a:t>
+              <a:t>1/31/18</a:t>
             </a:fld>
             <a:endParaRPr lang="en-US"/>
           </a:p>
@@ -1928,10 +1912,9 @@
           </a:lstStyle>
           <a:p>
             <a:r>
-              <a:rPr lang="en-US" smtClean="0"/>
+              <a:rPr lang="en-US"/>
               <a:t>Click to edit Master title style</a:t>
             </a:r>
-            <a:endParaRPr lang="en-US"/>
           </a:p>
         </p:txBody>
       </p:sp>
@@ -1985,38 +1968,37 @@
           <a:p>
             <a:pPr lvl="0"/>
             <a:r>
-              <a:rPr lang="en-US" smtClean="0"/>
+              <a:rPr lang="en-US"/>
               <a:t>Click to edit Master text styles</a:t>
             </a:r>
           </a:p>
           <a:p>
             <a:pPr lvl="1"/>
             <a:r>
-              <a:rPr lang="en-US" smtClean="0"/>
+              <a:rPr lang="en-US"/>
               <a:t>Second level</a:t>
             </a:r>
           </a:p>
           <a:p>
             <a:pPr lvl="2"/>
             <a:r>
-              <a:rPr lang="en-US" smtClean="0"/>
+              <a:rPr lang="en-US"/>
               <a:t>Third level</a:t>
             </a:r>
           </a:p>
           <a:p>
             <a:pPr lvl="3"/>
             <a:r>
-              <a:rPr lang="en-US" smtClean="0"/>
+              <a:rPr lang="en-US"/>
               <a:t>Fourth level</a:t>
             </a:r>
           </a:p>
           <a:p>
             <a:pPr lvl="4"/>
             <a:r>
-              <a:rPr lang="en-US" smtClean="0"/>
+              <a:rPr lang="en-US"/>
               <a:t>Fifth level</a:t>
             </a:r>
-            <a:endParaRPr lang="en-US"/>
           </a:p>
         </p:txBody>
       </p:sp>
@@ -2079,7 +2061,7 @@
           <a:p>
             <a:pPr lvl="0"/>
             <a:r>
-              <a:rPr lang="en-US" smtClean="0"/>
+              <a:rPr lang="en-US"/>
               <a:t>Click to edit Master text styles</a:t>
             </a:r>
           </a:p>
@@ -2102,7 +2084,7 @@
           <a:p>
             <a:fld id="{E2593520-FD55-7B49-9493-2A983CF880CA}" type="datetimeFigureOut">
               <a:rPr lang="en-US" smtClean="0"/>
-              <a:t>1/17/18</a:t>
+              <a:t>1/31/18</a:t>
             </a:fld>
             <a:endParaRPr lang="en-US"/>
           </a:p>
@@ -2205,10 +2187,9 @@
           </a:lstStyle>
           <a:p>
             <a:r>
-              <a:rPr lang="en-US" smtClean="0"/>
+              <a:rPr lang="en-US"/>
               <a:t>Click to edit Master title style</a:t>
             </a:r>
-            <a:endParaRPr lang="en-US"/>
           </a:p>
         </p:txBody>
       </p:sp>
@@ -2332,7 +2313,7 @@
           <a:p>
             <a:pPr lvl="0"/>
             <a:r>
-              <a:rPr lang="en-US" smtClean="0"/>
+              <a:rPr lang="en-US"/>
               <a:t>Click to edit Master text styles</a:t>
             </a:r>
           </a:p>
@@ -2355,7 +2336,7 @@
           <a:p>
             <a:fld id="{E2593520-FD55-7B49-9493-2A983CF880CA}" type="datetimeFigureOut">
               <a:rPr lang="en-US" smtClean="0"/>
-              <a:t>1/17/18</a:t>
+              <a:t>1/31/18</a:t>
             </a:fld>
             <a:endParaRPr lang="en-US"/>
           </a:p>
@@ -2464,10 +2445,9 @@
           <a:lstStyle/>
           <a:p>
             <a:r>
-              <a:rPr lang="en-US" smtClean="0"/>
+              <a:rPr lang="en-US"/>
               <a:t>Click to edit Master title style</a:t>
             </a:r>
-            <a:endParaRPr lang="en-US"/>
           </a:p>
         </p:txBody>
       </p:sp>
@@ -2498,38 +2478,37 @@
           <a:p>
             <a:pPr lvl="0"/>
             <a:r>
-              <a:rPr lang="en-US" smtClean="0"/>
+              <a:rPr lang="en-US"/>
               <a:t>Click to edit Master text styles</a:t>
             </a:r>
           </a:p>
           <a:p>
             <a:pPr lvl="1"/>
             <a:r>
-              <a:rPr lang="en-US" smtClean="0"/>
+              <a:rPr lang="en-US"/>
               <a:t>Second level</a:t>
             </a:r>
           </a:p>
           <a:p>
             <a:pPr lvl="2"/>
             <a:r>
-              <a:rPr lang="en-US" smtClean="0"/>
+              <a:rPr lang="en-US"/>
               <a:t>Third level</a:t>
             </a:r>
           </a:p>
           <a:p>
             <a:pPr lvl="3"/>
             <a:r>
-              <a:rPr lang="en-US" smtClean="0"/>
+              <a:rPr lang="en-US"/>
               <a:t>Fourth level</a:t>
             </a:r>
           </a:p>
           <a:p>
             <a:pPr lvl="4"/>
             <a:r>
-              <a:rPr lang="en-US" smtClean="0"/>
+              <a:rPr lang="en-US"/>
               <a:t>Fifth level</a:t>
             </a:r>
-            <a:endParaRPr lang="en-US"/>
           </a:p>
         </p:txBody>
       </p:sp>
@@ -2568,7 +2547,7 @@
           <a:p>
             <a:fld id="{E2593520-FD55-7B49-9493-2A983CF880CA}" type="datetimeFigureOut">
               <a:rPr lang="en-US" smtClean="0"/>
-              <a:t>1/17/18</a:t>
+              <a:t>1/31/18</a:t>
             </a:fld>
             <a:endParaRPr lang="en-US"/>
           </a:p>
@@ -2989,10 +2968,9 @@
           <a:lstStyle/>
           <a:p>
             <a:r>
-              <a:rPr lang="en-US" dirty="0" smtClean="0"/>
+              <a:rPr lang="en-US" dirty="0"/>
               <a:t>FT Interoperability</a:t>
             </a:r>
-            <a:endParaRPr lang="en-US" dirty="0"/>
           </a:p>
         </p:txBody>
       </p:sp>
@@ -3012,14 +2990,18 @@
           <a:lstStyle/>
           <a:p>
             <a:r>
-              <a:rPr lang="en-US" dirty="0" smtClean="0"/>
+              <a:rPr lang="en-US" dirty="0"/>
               <a:t>Fault Tolerance WG</a:t>
             </a:r>
           </a:p>
           <a:p>
             <a:r>
-              <a:rPr lang="en-US" dirty="0" smtClean="0"/>
-              <a:t>January 10, 2018 Con Call</a:t>
+              <a:rPr lang="en-US"/>
+              <a:t>January 17, </a:t>
+            </a:r>
+            <a:r>
+              <a:rPr lang="en-US" dirty="0"/>
+              <a:t>2018 Con Call</a:t>
             </a:r>
           </a:p>
           <a:p>
@@ -3037,13 +3019,6 @@
   <p:clrMapOvr>
     <a:masterClrMapping/>
   </p:clrMapOvr>
-  <p:timing>
-    <p:tnLst>
-      <p:par>
-        <p:cTn id="1" dur="indefinite" restart="never" nodeType="tmRoot"/>
-      </p:par>
-    </p:tnLst>
-  </p:timing>
 </p:sld>
 </file>
 
@@ -3080,10 +3055,9 @@
           <a:lstStyle/>
           <a:p>
             <a:r>
-              <a:rPr lang="en-US" dirty="0" smtClean="0"/>
+              <a:rPr lang="en-US" dirty="0"/>
               <a:t>Goal</a:t>
             </a:r>
-            <a:endParaRPr lang="en-US" dirty="0"/>
           </a:p>
         </p:txBody>
       </p:sp>
@@ -3103,10 +3077,9 @@
           <a:lstStyle/>
           <a:p>
             <a:r>
-              <a:rPr lang="en-US" dirty="0" smtClean="0"/>
+              <a:rPr lang="en-US" dirty="0"/>
               <a:t>Allow the user to pick which FT model they want to use</a:t>
             </a:r>
-            <a:endParaRPr lang="en-US" dirty="0"/>
           </a:p>
         </p:txBody>
       </p:sp>
@@ -3120,13 +3093,6 @@
   <p:clrMapOvr>
     <a:masterClrMapping/>
   </p:clrMapOvr>
-  <p:timing>
-    <p:tnLst>
-      <p:par>
-        <p:cTn id="1" dur="indefinite" restart="never" nodeType="tmRoot"/>
-      </p:par>
-    </p:tnLst>
-  </p:timing>
 </p:sld>
 </file>
 
@@ -3163,10 +3129,9 @@
           <a:lstStyle/>
           <a:p>
             <a:r>
-              <a:rPr lang="en-US" dirty="0" smtClean="0"/>
+              <a:rPr lang="en-US" dirty="0"/>
               <a:t>Restrictions</a:t>
             </a:r>
-            <a:endParaRPr lang="en-US" dirty="0"/>
           </a:p>
         </p:txBody>
       </p:sp>
@@ -3186,37 +3151,36 @@
           <a:lstStyle/>
           <a:p>
             <a:r>
-              <a:rPr lang="en-US" dirty="0" smtClean="0"/>
+              <a:rPr lang="en-US" dirty="0"/>
               <a:t>Cannot use more than on FT model in a single application</a:t>
             </a:r>
           </a:p>
           <a:p>
             <a:pPr lvl="1"/>
             <a:r>
-              <a:rPr lang="en-US" dirty="0" smtClean="0"/>
+              <a:rPr lang="en-US" dirty="0"/>
               <a:t>Unsure if this can be implemented safely either by the user or the MPI library</a:t>
             </a:r>
           </a:p>
           <a:p>
             <a:r>
-              <a:rPr lang="en-US" dirty="0" smtClean="0"/>
+              <a:rPr lang="en-US" dirty="0"/>
               <a:t>Cannot change from using one model to another FT model later in the application</a:t>
             </a:r>
           </a:p>
           <a:p>
             <a:pPr lvl="1"/>
             <a:r>
-              <a:rPr lang="en-US" dirty="0" smtClean="0"/>
+              <a:rPr lang="en-US" dirty="0"/>
               <a:t>The user can “chain” multiple applications to accomplish this if necessary</a:t>
             </a:r>
           </a:p>
           <a:p>
             <a:pPr lvl="1"/>
             <a:r>
-              <a:rPr lang="en-US" dirty="0" smtClean="0"/>
+              <a:rPr lang="en-US" dirty="0"/>
               <a:t>We’re not sure that this restriction is necessary. The user could be allowed to guarantee that this is safe.</a:t>
             </a:r>
-            <a:endParaRPr lang="en-US" dirty="0"/>
           </a:p>
         </p:txBody>
       </p:sp>
@@ -3266,10 +3230,9 @@
           <a:lstStyle/>
           <a:p>
             <a:r>
-              <a:rPr lang="en-US" dirty="0" smtClean="0"/>
+              <a:rPr lang="en-US" dirty="0"/>
               <a:t>Introduce Three new APIs</a:t>
             </a:r>
-            <a:endParaRPr lang="en-US" dirty="0"/>
           </a:p>
         </p:txBody>
       </p:sp>
@@ -3291,100 +3254,83 @@
           <a:lstStyle/>
           <a:p>
             <a:r>
-              <a:rPr lang="en-US" dirty="0" smtClean="0"/>
+              <a:rPr lang="en-US" dirty="0"/>
               <a:t>First call queries which FT models are available to the user</a:t>
             </a:r>
           </a:p>
           <a:p>
             <a:pPr lvl="1"/>
             <a:r>
-              <a:rPr lang="en-US" dirty="0" smtClean="0"/>
+              <a:rPr lang="en-US" dirty="0"/>
               <a:t>Some might be standardized, others might not</a:t>
             </a:r>
           </a:p>
           <a:p>
             <a:pPr lvl="1"/>
             <a:r>
-              <a:rPr lang="en-US" dirty="0" smtClean="0"/>
-              <a:t>Might not need this based on discussion on next </a:t>
-            </a:r>
-            <a:r>
-              <a:rPr lang="en-US" dirty="0" smtClean="0"/>
-              <a:t>slide</a:t>
-            </a:r>
-            <a:endParaRPr lang="en-US" dirty="0"/>
-          </a:p>
-          <a:p>
-            <a:r>
-              <a:rPr lang="en-US" dirty="0" smtClean="0"/>
+              <a:rPr lang="en-US" dirty="0"/>
+              <a:t>Might not need this based on discussion on next slide</a:t>
+            </a:r>
+          </a:p>
+          <a:p>
+            <a:r>
+              <a:rPr lang="en-US" dirty="0"/>
               <a:t>Second call tells MPI which model the user picks</a:t>
             </a:r>
           </a:p>
           <a:p>
             <a:pPr lvl="1"/>
             <a:r>
-              <a:rPr lang="en-US" dirty="0" smtClean="0"/>
+              <a:rPr lang="en-US" dirty="0"/>
               <a:t>Should return success or failure to indicate that the implementation was able to choose the requested model</a:t>
             </a:r>
           </a:p>
           <a:p>
             <a:pPr lvl="2"/>
             <a:r>
-              <a:rPr lang="en-US" dirty="0" smtClean="0"/>
+              <a:rPr lang="en-US" dirty="0"/>
               <a:t>Prevents a library from picking one model and the application from picking another</a:t>
             </a:r>
           </a:p>
           <a:p>
             <a:pPr lvl="2"/>
             <a:r>
-              <a:rPr lang="en-US" dirty="0" smtClean="0"/>
+              <a:rPr lang="en-US" dirty="0"/>
               <a:t>First one in wins</a:t>
             </a:r>
           </a:p>
           <a:p>
             <a:pPr lvl="1"/>
             <a:r>
-              <a:rPr lang="en-US" dirty="0" smtClean="0"/>
+              <a:rPr lang="en-US" dirty="0"/>
               <a:t>We need to make sure that the user doesn’t change the model while communication is ongoing</a:t>
             </a:r>
           </a:p>
           <a:p>
             <a:pPr lvl="1"/>
             <a:r>
-              <a:rPr lang="en-US" dirty="0" smtClean="0"/>
-              <a:t>We could make this </a:t>
-            </a:r>
-            <a:r>
-              <a:rPr lang="en-US" dirty="0" smtClean="0"/>
-              <a:t>collective </a:t>
-            </a:r>
-            <a:r>
-              <a:rPr lang="en-US" dirty="0" smtClean="0"/>
-              <a:t>in the same way as MPI_FINALIZE to help enforce the fact that user communication is done.</a:t>
+              <a:rPr lang="en-US" dirty="0"/>
+              <a:t>We could make this collective in the same way as MPI_FINALIZE to help enforce the fact that user communication is done.</a:t>
             </a:r>
           </a:p>
           <a:p>
             <a:pPr lvl="2"/>
             <a:r>
-              <a:rPr lang="en-US" dirty="0" smtClean="0"/>
+              <a:rPr lang="en-US" dirty="0"/>
               <a:t>If we do this, we will want to require all processes to pick the same model.</a:t>
             </a:r>
           </a:p>
           <a:p>
             <a:pPr lvl="1"/>
             <a:r>
-              <a:rPr lang="en-US" dirty="0" smtClean="0"/>
-              <a:t>This function should return the current model so the user can use it as a query function when composing libraries</a:t>
-            </a:r>
-            <a:r>
-              <a:rPr lang="en-US" dirty="0" smtClean="0"/>
-              <a:t>.</a:t>
+              <a:rPr lang="en-US" dirty="0"/>
+              <a:t>This function should return the current model so the user can use it as a query function when composing libraries.</a:t>
             </a:r>
           </a:p>
           <a:p>
             <a:pPr lvl="1"/>
             <a:r>
-              <a:rPr lang="en-US" dirty="0" smtClean="0">
+              <a:rPr lang="en-US" dirty="0">
                 <a:solidFill>
                   <a:srgbClr val="FF0000"/>
                 </a:solidFill>
@@ -3395,7 +3341,7 @@
           <a:p>
             <a:pPr lvl="1"/>
             <a:r>
-              <a:rPr lang="en-US" dirty="0" smtClean="0">
+              <a:rPr lang="en-US" dirty="0">
                 <a:solidFill>
                   <a:srgbClr val="FF0000"/>
                 </a:solidFill>
@@ -3406,7 +3352,7 @@
           <a:p>
             <a:pPr lvl="2"/>
             <a:r>
-              <a:rPr lang="en-US" dirty="0" smtClean="0">
+              <a:rPr lang="en-US" dirty="0">
                 <a:solidFill>
                   <a:srgbClr val="FF0000"/>
                 </a:solidFill>
@@ -3417,21 +3363,21 @@
           </a:p>
           <a:p>
             <a:r>
-              <a:rPr lang="en-US" dirty="0" smtClean="0"/>
+              <a:rPr lang="en-US" dirty="0"/>
               <a:t>Third call queries the currently chosen FT model</a:t>
             </a:r>
           </a:p>
           <a:p>
             <a:pPr lvl="1"/>
             <a:r>
-              <a:rPr lang="en-US" dirty="0" smtClean="0"/>
+              <a:rPr lang="en-US" dirty="0"/>
               <a:t>Maybe this works better by combining the second and third function into a compare-and-swap type of function.</a:t>
             </a:r>
           </a:p>
           <a:p>
             <a:pPr lvl="2"/>
             <a:r>
-              <a:rPr lang="en-US" dirty="0" smtClean="0"/>
+              <a:rPr lang="en-US" dirty="0"/>
               <a:t>The initial setting of the FT model would be something like MPI_FT_NONE</a:t>
             </a:r>
           </a:p>
@@ -3483,10 +3429,9 @@
           <a:lstStyle/>
           <a:p>
             <a:r>
-              <a:rPr lang="en-US" dirty="0" smtClean="0"/>
+              <a:rPr lang="en-US" dirty="0"/>
               <a:t>Questions for Discussion</a:t>
             </a:r>
-            <a:endParaRPr lang="en-US" dirty="0"/>
           </a:p>
         </p:txBody>
       </p:sp>
@@ -3506,60 +3451,60 @@
           <a:lstStyle/>
           <a:p>
             <a:r>
-              <a:rPr lang="en-US" dirty="0" smtClean="0"/>
+              <a:rPr lang="en-US" dirty="0"/>
               <a:t>Should the user receive a string or an </a:t>
             </a:r>
             <a:r>
-              <a:rPr lang="en-US" dirty="0" err="1" smtClean="0"/>
+              <a:rPr lang="en-US" dirty="0" err="1"/>
               <a:t>int</a:t>
             </a:r>
             <a:r>
-              <a:rPr lang="en-US" dirty="0" smtClean="0"/>
+              <a:rPr lang="en-US" dirty="0"/>
               <a:t> (</a:t>
             </a:r>
             <a:r>
-              <a:rPr lang="en-US" dirty="0" err="1" smtClean="0"/>
+              <a:rPr lang="en-US" dirty="0" err="1"/>
               <a:t>enum</a:t>
             </a:r>
             <a:r>
-              <a:rPr lang="en-US" dirty="0" smtClean="0"/>
+              <a:rPr lang="en-US" dirty="0"/>
               <a:t>)?</a:t>
             </a:r>
           </a:p>
           <a:p>
             <a:pPr lvl="1"/>
             <a:r>
-              <a:rPr lang="en-US" dirty="0" smtClean="0"/>
+              <a:rPr lang="en-US" dirty="0"/>
               <a:t>The </a:t>
             </a:r>
             <a:r>
-              <a:rPr lang="en-US" dirty="0" err="1" smtClean="0"/>
+              <a:rPr lang="en-US" dirty="0" err="1"/>
               <a:t>enum</a:t>
             </a:r>
             <a:r>
-              <a:rPr lang="en-US" dirty="0" smtClean="0"/>
+              <a:rPr lang="en-US" dirty="0"/>
               <a:t> is easier</a:t>
             </a:r>
           </a:p>
           <a:p>
             <a:pPr lvl="2"/>
             <a:r>
-              <a:rPr lang="en-US" dirty="0" smtClean="0"/>
+              <a:rPr lang="en-US" dirty="0"/>
               <a:t>Don’t have to worry about memory management</a:t>
             </a:r>
           </a:p>
           <a:p>
             <a:pPr lvl="2"/>
             <a:r>
-              <a:rPr lang="en-US" dirty="0" smtClean="0"/>
+              <a:rPr lang="en-US" dirty="0"/>
               <a:t>Can refer to </a:t>
             </a:r>
             <a:r>
-              <a:rPr lang="en-US" dirty="0" err="1" smtClean="0"/>
+              <a:rPr lang="en-US" dirty="0" err="1"/>
               <a:t>mpi.h</a:t>
             </a:r>
             <a:r>
-              <a:rPr lang="en-US" dirty="0" smtClean="0"/>
+              <a:rPr lang="en-US" dirty="0"/>
               <a:t> to figure out what values mean</a:t>
             </a:r>
           </a:p>
@@ -3571,42 +3516,34 @@
                   <a:schemeClr val="accent6"/>
                 </a:solidFill>
               </a:rPr>
-              <a:t>T</a:t>
-            </a:r>
-            <a:r>
-              <a:rPr lang="en-US" dirty="0" smtClean="0">
-                <a:solidFill>
-                  <a:schemeClr val="accent6"/>
-                </a:solidFill>
-              </a:rPr>
-              <a:t>he string is safer (let’s pick this one)</a:t>
+              <a:t>The string is safer (let’s pick this one)</a:t>
             </a:r>
           </a:p>
           <a:p>
             <a:pPr lvl="2"/>
             <a:r>
-              <a:rPr lang="en-US" dirty="0" smtClean="0"/>
+              <a:rPr lang="en-US" dirty="0"/>
               <a:t>Harder to overlap values between implementations and inadvertently pick the wrong FT model</a:t>
             </a:r>
           </a:p>
           <a:p>
             <a:pPr lvl="2"/>
             <a:r>
-              <a:rPr lang="en-US" dirty="0" smtClean="0"/>
+              <a:rPr lang="en-US" dirty="0"/>
               <a:t>Requires the user to free the string later (or whatever we do for strings with MPI_INFO)</a:t>
             </a:r>
           </a:p>
           <a:p>
             <a:pPr lvl="2"/>
             <a:r>
-              <a:rPr lang="en-US" dirty="0" smtClean="0"/>
+              <a:rPr lang="en-US" dirty="0"/>
               <a:t>Ensures that the programs will always compile even when non-standard models are picked.</a:t>
             </a:r>
           </a:p>
           <a:p>
             <a:pPr lvl="2"/>
             <a:r>
-              <a:rPr lang="en-US" dirty="0" smtClean="0">
+              <a:rPr lang="en-US" dirty="0">
                 <a:solidFill>
                   <a:srgbClr val="FF0000"/>
                 </a:solidFill>

</xml_diff>